<commit_message>
Added "ShoppingCart" example to code and presentation.
</commit_message>
<xml_diff>
--- a/TradeMinder F# - C#.pptx
+++ b/TradeMinder F# - C#.pptx
@@ -5,7 +5,7 @@
     <p:sldMasterId id="2147483696" r:id="rId1"/>
   </p:sldMasterIdLst>
   <p:notesMasterIdLst>
-    <p:notesMasterId r:id="rId24"/>
+    <p:notesMasterId r:id="rId30"/>
   </p:notesMasterIdLst>
   <p:sldIdLst>
     <p:sldId id="256" r:id="rId2"/>
@@ -29,7 +29,13 @@
     <p:sldId id="274" r:id="rId20"/>
     <p:sldId id="275" r:id="rId21"/>
     <p:sldId id="276" r:id="rId22"/>
-    <p:sldId id="277" r:id="rId23"/>
+    <p:sldId id="279" r:id="rId23"/>
+    <p:sldId id="277" r:id="rId24"/>
+    <p:sldId id="278" r:id="rId25"/>
+    <p:sldId id="280" r:id="rId26"/>
+    <p:sldId id="281" r:id="rId27"/>
+    <p:sldId id="282" r:id="rId28"/>
+    <p:sldId id="283" r:id="rId29"/>
   </p:sldIdLst>
   <p:sldSz cx="12192000" cy="6858000"/>
   <p:notesSz cx="6858000" cy="9144000"/>
@@ -128,6 +134,11 @@
       </a:defRPr>
     </a:lvl9pPr>
   </p:defaultTextStyle>
+  <p:extLst>
+    <p:ext uri="{EFAFB233-063F-42B5-8137-9DF3F51BA10A}">
+      <p15:sldGuideLst xmlns:p15="http://schemas.microsoft.com/office/powerpoint/2012/main"/>
+    </p:ext>
+  </p:extLst>
 </p:presentation>
 </file>
 
@@ -7201,7 +7212,7 @@
         </p:spPr>
         <p:txBody>
           <a:bodyPr>
-            <a:normAutofit lnSpcReduction="10000"/>
+            <a:normAutofit/>
           </a:bodyPr>
           <a:lstStyle/>
           <a:p>
@@ -9496,6 +9507,190 @@
           <p:cNvPr id="2" name="Title 1">
             <a:extLst>
               <a:ext uri="{FF2B5EF4-FFF2-40B4-BE49-F238E27FC236}">
+                <a16:creationId xmlns:a16="http://schemas.microsoft.com/office/drawing/2014/main" id="{169EB7D1-2F0C-4C33-9B68-39874BE6CDC2}"/>
+              </a:ext>
+            </a:extLst>
+          </p:cNvPr>
+          <p:cNvSpPr>
+            <a:spLocks noGrp="1"/>
+          </p:cNvSpPr>
+          <p:nvPr>
+            <p:ph type="title"/>
+          </p:nvPr>
+        </p:nvSpPr>
+        <p:spPr/>
+        <p:txBody>
+          <a:bodyPr/>
+          <a:lstStyle/>
+          <a:p>
+            <a:r>
+              <a:rPr lang="en-US" dirty="0"/>
+              <a:t>Refactoring: Partial to Full Testability</a:t>
+            </a:r>
+          </a:p>
+        </p:txBody>
+      </p:sp>
+      <p:sp>
+        <p:nvSpPr>
+          <p:cNvPr id="20" name="Text Placeholder 19">
+            <a:extLst>
+              <a:ext uri="{FF2B5EF4-FFF2-40B4-BE49-F238E27FC236}">
+                <a16:creationId xmlns:a16="http://schemas.microsoft.com/office/drawing/2014/main" id="{C845D57F-B65A-429F-93BA-B3A20359FC47}"/>
+              </a:ext>
+            </a:extLst>
+          </p:cNvPr>
+          <p:cNvSpPr>
+            <a:spLocks noGrp="1"/>
+          </p:cNvSpPr>
+          <p:nvPr>
+            <p:ph type="body" idx="1"/>
+          </p:nvPr>
+        </p:nvSpPr>
+        <p:spPr>
+          <a:xfrm>
+            <a:off x="0" y="1905000"/>
+            <a:ext cx="4396338" cy="576262"/>
+          </a:xfrm>
+        </p:spPr>
+        <p:txBody>
+          <a:bodyPr/>
+          <a:lstStyle/>
+          <a:p>
+            <a:r>
+              <a:rPr lang="en-US" dirty="0"/>
+              <a:t>Phase 2</a:t>
+            </a:r>
+          </a:p>
+        </p:txBody>
+      </p:sp>
+      <p:sp>
+        <p:nvSpPr>
+          <p:cNvPr id="22" name="Text Placeholder 21">
+            <a:extLst>
+              <a:ext uri="{FF2B5EF4-FFF2-40B4-BE49-F238E27FC236}">
+                <a16:creationId xmlns:a16="http://schemas.microsoft.com/office/drawing/2014/main" id="{C26965E4-4241-4831-8BF0-6C604CA4C2A1}"/>
+              </a:ext>
+            </a:extLst>
+          </p:cNvPr>
+          <p:cNvSpPr>
+            <a:spLocks noGrp="1"/>
+          </p:cNvSpPr>
+          <p:nvPr>
+            <p:ph type="body" sz="quarter" idx="3"/>
+          </p:nvPr>
+        </p:nvSpPr>
+        <p:spPr>
+          <a:xfrm>
+            <a:off x="6033854" y="1905000"/>
+            <a:ext cx="4396339" cy="576262"/>
+          </a:xfrm>
+        </p:spPr>
+        <p:txBody>
+          <a:bodyPr/>
+          <a:lstStyle/>
+          <a:p>
+            <a:r>
+              <a:rPr lang="en-US" dirty="0"/>
+              <a:t>Phase 3</a:t>
+            </a:r>
+          </a:p>
+        </p:txBody>
+      </p:sp>
+      <p:pic>
+        <p:nvPicPr>
+          <p:cNvPr id="26" name="Picture 25">
+            <a:extLst>
+              <a:ext uri="{FF2B5EF4-FFF2-40B4-BE49-F238E27FC236}">
+                <a16:creationId xmlns:a16="http://schemas.microsoft.com/office/drawing/2014/main" id="{8636F7D2-6B9C-4358-B6D7-B416316C0DC6}"/>
+              </a:ext>
+            </a:extLst>
+          </p:cNvPr>
+          <p:cNvPicPr>
+            <a:picLocks noChangeAspect="1"/>
+          </p:cNvPicPr>
+          <p:nvPr/>
+        </p:nvPicPr>
+        <p:blipFill>
+          <a:blip r:embed="rId2"/>
+          <a:stretch>
+            <a:fillRect/>
+          </a:stretch>
+        </p:blipFill>
+        <p:spPr>
+          <a:xfrm>
+            <a:off x="97006" y="2533014"/>
+            <a:ext cx="5963482" cy="2848373"/>
+          </a:xfrm>
+          <a:prstGeom prst="rect">
+            <a:avLst/>
+          </a:prstGeom>
+        </p:spPr>
+      </p:pic>
+      <p:pic>
+        <p:nvPicPr>
+          <p:cNvPr id="27" name="Picture 26">
+            <a:extLst>
+              <a:ext uri="{FF2B5EF4-FFF2-40B4-BE49-F238E27FC236}">
+                <a16:creationId xmlns:a16="http://schemas.microsoft.com/office/drawing/2014/main" id="{58E3662E-2D24-4AEF-A5FE-124A18702784}"/>
+              </a:ext>
+            </a:extLst>
+          </p:cNvPr>
+          <p:cNvPicPr>
+            <a:picLocks noChangeAspect="1"/>
+          </p:cNvPicPr>
+          <p:nvPr/>
+        </p:nvPicPr>
+        <p:blipFill>
+          <a:blip r:embed="rId3"/>
+          <a:stretch>
+            <a:fillRect/>
+          </a:stretch>
+        </p:blipFill>
+        <p:spPr>
+          <a:xfrm>
+            <a:off x="6111858" y="2533014"/>
+            <a:ext cx="5982535" cy="3962953"/>
+          </a:xfrm>
+          <a:prstGeom prst="rect">
+            <a:avLst/>
+          </a:prstGeom>
+        </p:spPr>
+      </p:pic>
+    </p:spTree>
+    <p:extLst>
+      <p:ext uri="{BB962C8B-B14F-4D97-AF65-F5344CB8AC3E}">
+        <p14:creationId xmlns:p14="http://schemas.microsoft.com/office/powerpoint/2010/main" val="3181213068"/>
+      </p:ext>
+    </p:extLst>
+  </p:cSld>
+  <p:clrMapOvr>
+    <a:masterClrMapping/>
+  </p:clrMapOvr>
+</p:sld>
+</file>
+
+<file path=ppt/slides/slide23.xml><?xml version="1.0" encoding="utf-8"?>
+<p:sld xmlns:a="http://schemas.openxmlformats.org/drawingml/2006/main" xmlns:r="http://schemas.openxmlformats.org/officeDocument/2006/relationships" xmlns:p="http://schemas.openxmlformats.org/presentationml/2006/main">
+  <p:cSld>
+    <p:spTree>
+      <p:nvGrpSpPr>
+        <p:cNvPr id="1" name=""/>
+        <p:cNvGrpSpPr/>
+        <p:nvPr/>
+      </p:nvGrpSpPr>
+      <p:grpSpPr>
+        <a:xfrm>
+          <a:off x="0" y="0"/>
+          <a:ext cx="0" cy="0"/>
+          <a:chOff x="0" y="0"/>
+          <a:chExt cx="0" cy="0"/>
+        </a:xfrm>
+      </p:grpSpPr>
+      <p:sp>
+        <p:nvSpPr>
+          <p:cNvPr id="2" name="Title 1">
+            <a:extLst>
+              <a:ext uri="{FF2B5EF4-FFF2-40B4-BE49-F238E27FC236}">
                 <a16:creationId xmlns:a16="http://schemas.microsoft.com/office/drawing/2014/main" id="{04330AE9-6454-4E85-99AC-30B789471F1E}"/>
               </a:ext>
             </a:extLst>
@@ -9643,6 +9838,938 @@
     <p:extLst>
       <p:ext uri="{BB962C8B-B14F-4D97-AF65-F5344CB8AC3E}">
         <p14:creationId xmlns:p14="http://schemas.microsoft.com/office/powerpoint/2010/main" val="229387714"/>
+      </p:ext>
+    </p:extLst>
+  </p:cSld>
+  <p:clrMapOvr>
+    <a:masterClrMapping/>
+  </p:clrMapOvr>
+</p:sld>
+</file>
+
+<file path=ppt/slides/slide24.xml><?xml version="1.0" encoding="utf-8"?>
+<p:sld xmlns:a="http://schemas.openxmlformats.org/drawingml/2006/main" xmlns:r="http://schemas.openxmlformats.org/officeDocument/2006/relationships" xmlns:p="http://schemas.openxmlformats.org/presentationml/2006/main">
+  <p:cSld>
+    <p:spTree>
+      <p:nvGrpSpPr>
+        <p:cNvPr id="1" name=""/>
+        <p:cNvGrpSpPr/>
+        <p:nvPr/>
+      </p:nvGrpSpPr>
+      <p:grpSpPr>
+        <a:xfrm>
+          <a:off x="0" y="0"/>
+          <a:ext cx="0" cy="0"/>
+          <a:chOff x="0" y="0"/>
+          <a:chExt cx="0" cy="0"/>
+        </a:xfrm>
+      </p:grpSpPr>
+      <p:sp>
+        <p:nvSpPr>
+          <p:cNvPr id="2" name="Title 1">
+            <a:extLst>
+              <a:ext uri="{FF2B5EF4-FFF2-40B4-BE49-F238E27FC236}">
+                <a16:creationId xmlns:a16="http://schemas.microsoft.com/office/drawing/2014/main" id="{FE1307B6-8205-4DBE-8AE8-3FDD4E40AE0D}"/>
+              </a:ext>
+            </a:extLst>
+          </p:cNvPr>
+          <p:cNvSpPr>
+            <a:spLocks noGrp="1"/>
+          </p:cNvSpPr>
+          <p:nvPr>
+            <p:ph type="title"/>
+          </p:nvPr>
+        </p:nvSpPr>
+        <p:spPr>
+          <a:xfrm>
+            <a:off x="646111" y="452718"/>
+            <a:ext cx="9404723" cy="1400530"/>
+          </a:xfrm>
+        </p:spPr>
+        <p:txBody>
+          <a:bodyPr/>
+          <a:lstStyle/>
+          <a:p>
+            <a:r>
+              <a:rPr lang="en-US" dirty="0"/>
+              <a:t>Side-by-side: Solution Layout</a:t>
+            </a:r>
+          </a:p>
+        </p:txBody>
+      </p:sp>
+      <p:sp>
+        <p:nvSpPr>
+          <p:cNvPr id="5" name="Text Placeholder 4">
+            <a:extLst>
+              <a:ext uri="{FF2B5EF4-FFF2-40B4-BE49-F238E27FC236}">
+                <a16:creationId xmlns:a16="http://schemas.microsoft.com/office/drawing/2014/main" id="{293B56AD-0C12-4060-8B01-B61E934F12DB}"/>
+              </a:ext>
+            </a:extLst>
+          </p:cNvPr>
+          <p:cNvSpPr>
+            <a:spLocks noGrp="1"/>
+          </p:cNvSpPr>
+          <p:nvPr>
+            <p:ph type="body" sz="quarter" idx="3"/>
+          </p:nvPr>
+        </p:nvSpPr>
+        <p:spPr>
+          <a:xfrm>
+            <a:off x="726860" y="1905000"/>
+            <a:ext cx="4396339" cy="576262"/>
+          </a:xfrm>
+        </p:spPr>
+        <p:txBody>
+          <a:bodyPr/>
+          <a:lstStyle/>
+          <a:p>
+            <a:r>
+              <a:rPr lang="en-US" dirty="0"/>
+              <a:t>C#</a:t>
+            </a:r>
+          </a:p>
+        </p:txBody>
+      </p:sp>
+      <p:sp>
+        <p:nvSpPr>
+          <p:cNvPr id="6" name="Content Placeholder 5">
+            <a:extLst>
+              <a:ext uri="{FF2B5EF4-FFF2-40B4-BE49-F238E27FC236}">
+                <a16:creationId xmlns:a16="http://schemas.microsoft.com/office/drawing/2014/main" id="{7D772B96-99A3-4578-AA39-BD1EBF82A7A9}"/>
+              </a:ext>
+            </a:extLst>
+          </p:cNvPr>
+          <p:cNvSpPr>
+            <a:spLocks noGrp="1"/>
+          </p:cNvSpPr>
+          <p:nvPr>
+            <p:ph sz="quarter" idx="4"/>
+          </p:nvPr>
+        </p:nvSpPr>
+        <p:spPr>
+          <a:xfrm>
+            <a:off x="726861" y="2514600"/>
+            <a:ext cx="2788168" cy="3741738"/>
+          </a:xfrm>
+        </p:spPr>
+        <p:txBody>
+          <a:bodyPr>
+            <a:normAutofit lnSpcReduction="10000"/>
+          </a:bodyPr>
+          <a:lstStyle/>
+          <a:p>
+            <a:r>
+              <a:rPr lang="en-US" dirty="0"/>
+              <a:t>Entities are often </a:t>
+            </a:r>
+            <a:br>
+              <a:rPr lang="en-US" dirty="0"/>
+            </a:br>
+            <a:r>
+              <a:rPr lang="en-US" dirty="0"/>
+              <a:t>1 file per class</a:t>
+            </a:r>
+          </a:p>
+          <a:p>
+            <a:endParaRPr lang="en-US" dirty="0"/>
+          </a:p>
+          <a:p>
+            <a:r>
+              <a:rPr lang="en-US" dirty="0"/>
+              <a:t>Interfaces are necessary for testability; and they are often used even if no tests are written to adhere to best practices (loose coupling).</a:t>
+            </a:r>
+          </a:p>
+          <a:p>
+            <a:r>
+              <a:rPr lang="en-US" dirty="0"/>
+              <a:t>Files listed in ABC order</a:t>
+            </a:r>
+          </a:p>
+        </p:txBody>
+      </p:sp>
+      <p:pic>
+        <p:nvPicPr>
+          <p:cNvPr id="10" name="Picture 9">
+            <a:extLst>
+              <a:ext uri="{FF2B5EF4-FFF2-40B4-BE49-F238E27FC236}">
+                <a16:creationId xmlns:a16="http://schemas.microsoft.com/office/drawing/2014/main" id="{64DC9CC8-69FC-4E1E-8091-9CDC9BA54535}"/>
+              </a:ext>
+            </a:extLst>
+          </p:cNvPr>
+          <p:cNvPicPr>
+            <a:picLocks noChangeAspect="1"/>
+          </p:cNvPicPr>
+          <p:nvPr/>
+        </p:nvPicPr>
+        <p:blipFill>
+          <a:blip r:embed="rId2"/>
+          <a:stretch>
+            <a:fillRect/>
+          </a:stretch>
+        </p:blipFill>
+        <p:spPr>
+          <a:xfrm>
+            <a:off x="3646058" y="2533014"/>
+            <a:ext cx="2343150" cy="3248025"/>
+          </a:xfrm>
+          <a:prstGeom prst="rect">
+            <a:avLst/>
+          </a:prstGeom>
+        </p:spPr>
+      </p:pic>
+      <p:sp>
+        <p:nvSpPr>
+          <p:cNvPr id="13" name="Text Placeholder 2">
+            <a:extLst>
+              <a:ext uri="{FF2B5EF4-FFF2-40B4-BE49-F238E27FC236}">
+                <a16:creationId xmlns:a16="http://schemas.microsoft.com/office/drawing/2014/main" id="{B8ED4B78-3338-49B5-85CD-F88DDB456EDF}"/>
+              </a:ext>
+            </a:extLst>
+          </p:cNvPr>
+          <p:cNvSpPr>
+            <a:spLocks noGrp="1"/>
+          </p:cNvSpPr>
+          <p:nvPr>
+            <p:ph type="body" idx="1"/>
+          </p:nvPr>
+        </p:nvSpPr>
+        <p:spPr>
+          <a:xfrm>
+            <a:off x="6660410" y="1905000"/>
+            <a:ext cx="4396338" cy="576262"/>
+          </a:xfrm>
+        </p:spPr>
+        <p:txBody>
+          <a:bodyPr/>
+          <a:lstStyle/>
+          <a:p>
+            <a:r>
+              <a:rPr lang="en-US" dirty="0"/>
+              <a:t>F#</a:t>
+            </a:r>
+          </a:p>
+        </p:txBody>
+      </p:sp>
+      <p:sp>
+        <p:nvSpPr>
+          <p:cNvPr id="14" name="Content Placeholder 3">
+            <a:extLst>
+              <a:ext uri="{FF2B5EF4-FFF2-40B4-BE49-F238E27FC236}">
+                <a16:creationId xmlns:a16="http://schemas.microsoft.com/office/drawing/2014/main" id="{96D479C2-1C64-445C-AE99-5B6A15381E3E}"/>
+              </a:ext>
+            </a:extLst>
+          </p:cNvPr>
+          <p:cNvSpPr>
+            <a:spLocks noGrp="1"/>
+          </p:cNvSpPr>
+          <p:nvPr>
+            <p:ph sz="half" idx="2"/>
+          </p:nvPr>
+        </p:nvSpPr>
+        <p:spPr>
+          <a:xfrm>
+            <a:off x="6600521" y="2514600"/>
+            <a:ext cx="2788168" cy="3741738"/>
+          </a:xfrm>
+        </p:spPr>
+        <p:txBody>
+          <a:bodyPr>
+            <a:normAutofit lnSpcReduction="10000"/>
+          </a:bodyPr>
+          <a:lstStyle/>
+          <a:p>
+            <a:r>
+              <a:rPr lang="en-US" dirty="0"/>
+              <a:t>Entities often live in modules alongside functions</a:t>
+            </a:r>
+          </a:p>
+          <a:p>
+            <a:r>
+              <a:rPr lang="en-US" dirty="0"/>
+              <a:t>Interfaces are never needed for testability or loose coupling.</a:t>
+            </a:r>
+          </a:p>
+          <a:p>
+            <a:endParaRPr lang="en-US" dirty="0"/>
+          </a:p>
+          <a:p>
+            <a:endParaRPr lang="en-US" dirty="0"/>
+          </a:p>
+          <a:p>
+            <a:endParaRPr lang="en-US" dirty="0"/>
+          </a:p>
+          <a:p>
+            <a:r>
+              <a:rPr lang="en-US" dirty="0"/>
+              <a:t>Files are order dependent</a:t>
+            </a:r>
+          </a:p>
+        </p:txBody>
+      </p:sp>
+      <p:pic>
+        <p:nvPicPr>
+          <p:cNvPr id="15" name="Picture 14">
+            <a:extLst>
+              <a:ext uri="{FF2B5EF4-FFF2-40B4-BE49-F238E27FC236}">
+                <a16:creationId xmlns:a16="http://schemas.microsoft.com/office/drawing/2014/main" id="{1624C5AE-FFA2-4D75-84AE-ABAB4E2783AC}"/>
+              </a:ext>
+            </a:extLst>
+          </p:cNvPr>
+          <p:cNvPicPr>
+            <a:picLocks noChangeAspect="1"/>
+          </p:cNvPicPr>
+          <p:nvPr/>
+        </p:nvPicPr>
+        <p:blipFill>
+          <a:blip r:embed="rId3"/>
+          <a:stretch>
+            <a:fillRect/>
+          </a:stretch>
+        </p:blipFill>
+        <p:spPr>
+          <a:xfrm>
+            <a:off x="9388689" y="2533014"/>
+            <a:ext cx="2076450" cy="1552575"/>
+          </a:xfrm>
+          <a:prstGeom prst="rect">
+            <a:avLst/>
+          </a:prstGeom>
+        </p:spPr>
+      </p:pic>
+    </p:spTree>
+    <p:extLst>
+      <p:ext uri="{BB962C8B-B14F-4D97-AF65-F5344CB8AC3E}">
+        <p14:creationId xmlns:p14="http://schemas.microsoft.com/office/powerpoint/2010/main" val="45220065"/>
+      </p:ext>
+    </p:extLst>
+  </p:cSld>
+  <p:clrMapOvr>
+    <a:masterClrMapping/>
+  </p:clrMapOvr>
+</p:sld>
+</file>
+
+<file path=ppt/slides/slide25.xml><?xml version="1.0" encoding="utf-8"?>
+<p:sld xmlns:a="http://schemas.openxmlformats.org/drawingml/2006/main" xmlns:r="http://schemas.openxmlformats.org/officeDocument/2006/relationships" xmlns:p="http://schemas.openxmlformats.org/presentationml/2006/main">
+  <p:cSld>
+    <p:spTree>
+      <p:nvGrpSpPr>
+        <p:cNvPr id="1" name=""/>
+        <p:cNvGrpSpPr/>
+        <p:nvPr/>
+      </p:nvGrpSpPr>
+      <p:grpSpPr>
+        <a:xfrm>
+          <a:off x="0" y="0"/>
+          <a:ext cx="0" cy="0"/>
+          <a:chOff x="0" y="0"/>
+          <a:chExt cx="0" cy="0"/>
+        </a:xfrm>
+      </p:grpSpPr>
+      <p:sp>
+        <p:nvSpPr>
+          <p:cNvPr id="2" name="Title 1">
+            <a:extLst>
+              <a:ext uri="{FF2B5EF4-FFF2-40B4-BE49-F238E27FC236}">
+                <a16:creationId xmlns:a16="http://schemas.microsoft.com/office/drawing/2014/main" id="{92FC65F2-A61F-4170-8ED9-19A12762CC2D}"/>
+              </a:ext>
+            </a:extLst>
+          </p:cNvPr>
+          <p:cNvSpPr>
+            <a:spLocks noGrp="1"/>
+          </p:cNvSpPr>
+          <p:nvPr>
+            <p:ph type="title"/>
+          </p:nvPr>
+        </p:nvSpPr>
+        <p:spPr/>
+        <p:txBody>
+          <a:bodyPr/>
+          <a:lstStyle/>
+          <a:p>
+            <a:r>
+              <a:rPr lang="en-US" dirty="0"/>
+              <a:t>Side-by-side: Database</a:t>
+            </a:r>
+          </a:p>
+        </p:txBody>
+      </p:sp>
+      <p:sp>
+        <p:nvSpPr>
+          <p:cNvPr id="3" name="Text Placeholder 2">
+            <a:extLst>
+              <a:ext uri="{FF2B5EF4-FFF2-40B4-BE49-F238E27FC236}">
+                <a16:creationId xmlns:a16="http://schemas.microsoft.com/office/drawing/2014/main" id="{10EA2A3A-A1E2-4520-943D-95094FFD30B2}"/>
+              </a:ext>
+            </a:extLst>
+          </p:cNvPr>
+          <p:cNvSpPr>
+            <a:spLocks noGrp="1"/>
+          </p:cNvSpPr>
+          <p:nvPr>
+            <p:ph type="body" idx="1"/>
+          </p:nvPr>
+        </p:nvSpPr>
+        <p:spPr>
+          <a:xfrm>
+            <a:off x="319597" y="997447"/>
+            <a:ext cx="4396338" cy="576262"/>
+          </a:xfrm>
+        </p:spPr>
+        <p:txBody>
+          <a:bodyPr/>
+          <a:lstStyle/>
+          <a:p>
+            <a:r>
+              <a:rPr lang="en-US" dirty="0"/>
+              <a:t>C# - </a:t>
+            </a:r>
+            <a:r>
+              <a:rPr lang="en-US" dirty="0" err="1"/>
+              <a:t>Database.cs</a:t>
+            </a:r>
+            <a:endParaRPr lang="en-US" dirty="0"/>
+          </a:p>
+        </p:txBody>
+      </p:sp>
+      <p:sp>
+        <p:nvSpPr>
+          <p:cNvPr id="5" name="Text Placeholder 4">
+            <a:extLst>
+              <a:ext uri="{FF2B5EF4-FFF2-40B4-BE49-F238E27FC236}">
+                <a16:creationId xmlns:a16="http://schemas.microsoft.com/office/drawing/2014/main" id="{05A6D049-CA1A-4163-884F-B24572F5FD12}"/>
+              </a:ext>
+            </a:extLst>
+          </p:cNvPr>
+          <p:cNvSpPr>
+            <a:spLocks noGrp="1"/>
+          </p:cNvSpPr>
+          <p:nvPr>
+            <p:ph type="body" sz="quarter" idx="3"/>
+          </p:nvPr>
+        </p:nvSpPr>
+        <p:spPr>
+          <a:xfrm>
+            <a:off x="6085063" y="997447"/>
+            <a:ext cx="4396339" cy="576262"/>
+          </a:xfrm>
+        </p:spPr>
+        <p:txBody>
+          <a:bodyPr/>
+          <a:lstStyle/>
+          <a:p>
+            <a:r>
+              <a:rPr lang="en-US" dirty="0"/>
+              <a:t>F# - </a:t>
+            </a:r>
+            <a:r>
+              <a:rPr lang="en-US" dirty="0" err="1"/>
+              <a:t>Database.fs</a:t>
+            </a:r>
+            <a:endParaRPr lang="en-US" dirty="0"/>
+          </a:p>
+        </p:txBody>
+      </p:sp>
+      <p:pic>
+        <p:nvPicPr>
+          <p:cNvPr id="7" name="Picture 6">
+            <a:extLst>
+              <a:ext uri="{FF2B5EF4-FFF2-40B4-BE49-F238E27FC236}">
+                <a16:creationId xmlns:a16="http://schemas.microsoft.com/office/drawing/2014/main" id="{0EC10273-42A0-448A-BA4D-D85A7518FB2B}"/>
+              </a:ext>
+            </a:extLst>
+          </p:cNvPr>
+          <p:cNvPicPr>
+            <a:picLocks noChangeAspect="1"/>
+          </p:cNvPicPr>
+          <p:nvPr/>
+        </p:nvPicPr>
+        <p:blipFill>
+          <a:blip r:embed="rId2"/>
+          <a:stretch>
+            <a:fillRect/>
+          </a:stretch>
+        </p:blipFill>
+        <p:spPr>
+          <a:xfrm>
+            <a:off x="319597" y="1604092"/>
+            <a:ext cx="5776403" cy="5182838"/>
+          </a:xfrm>
+          <a:prstGeom prst="rect">
+            <a:avLst/>
+          </a:prstGeom>
+        </p:spPr>
+      </p:pic>
+      <p:pic>
+        <p:nvPicPr>
+          <p:cNvPr id="9" name="Picture 8">
+            <a:extLst>
+              <a:ext uri="{FF2B5EF4-FFF2-40B4-BE49-F238E27FC236}">
+                <a16:creationId xmlns:a16="http://schemas.microsoft.com/office/drawing/2014/main" id="{61E13E98-2B92-4D4E-BD2E-103A82F028E9}"/>
+              </a:ext>
+            </a:extLst>
+          </p:cNvPr>
+          <p:cNvPicPr>
+            <a:picLocks noChangeAspect="1"/>
+          </p:cNvPicPr>
+          <p:nvPr/>
+        </p:nvPicPr>
+        <p:blipFill>
+          <a:blip r:embed="rId3"/>
+          <a:stretch>
+            <a:fillRect/>
+          </a:stretch>
+        </p:blipFill>
+        <p:spPr>
+          <a:xfrm>
+            <a:off x="6200728" y="1604092"/>
+            <a:ext cx="5791877" cy="3926696"/>
+          </a:xfrm>
+          <a:prstGeom prst="rect">
+            <a:avLst/>
+          </a:prstGeom>
+        </p:spPr>
+      </p:pic>
+    </p:spTree>
+    <p:extLst>
+      <p:ext uri="{BB962C8B-B14F-4D97-AF65-F5344CB8AC3E}">
+        <p14:creationId xmlns:p14="http://schemas.microsoft.com/office/powerpoint/2010/main" val="912934630"/>
+      </p:ext>
+    </p:extLst>
+  </p:cSld>
+  <p:clrMapOvr>
+    <a:masterClrMapping/>
+  </p:clrMapOvr>
+</p:sld>
+</file>
+
+<file path=ppt/slides/slide26.xml><?xml version="1.0" encoding="utf-8"?>
+<p:sld xmlns:a="http://schemas.openxmlformats.org/drawingml/2006/main" xmlns:r="http://schemas.openxmlformats.org/officeDocument/2006/relationships" xmlns:p="http://schemas.openxmlformats.org/presentationml/2006/main">
+  <p:cSld>
+    <p:spTree>
+      <p:nvGrpSpPr>
+        <p:cNvPr id="1" name=""/>
+        <p:cNvGrpSpPr/>
+        <p:nvPr/>
+      </p:nvGrpSpPr>
+      <p:grpSpPr>
+        <a:xfrm>
+          <a:off x="0" y="0"/>
+          <a:ext cx="0" cy="0"/>
+          <a:chOff x="0" y="0"/>
+          <a:chExt cx="0" cy="0"/>
+        </a:xfrm>
+      </p:grpSpPr>
+      <p:sp>
+        <p:nvSpPr>
+          <p:cNvPr id="2" name="Title 1">
+            <a:extLst>
+              <a:ext uri="{FF2B5EF4-FFF2-40B4-BE49-F238E27FC236}">
+                <a16:creationId xmlns:a16="http://schemas.microsoft.com/office/drawing/2014/main" id="{CD9999A5-805A-4B1A-85AA-B4D5D4FEA64C}"/>
+              </a:ext>
+            </a:extLst>
+          </p:cNvPr>
+          <p:cNvSpPr>
+            <a:spLocks noGrp="1"/>
+          </p:cNvSpPr>
+          <p:nvPr>
+            <p:ph type="title"/>
+          </p:nvPr>
+        </p:nvSpPr>
+        <p:spPr/>
+        <p:txBody>
+          <a:bodyPr/>
+          <a:lstStyle/>
+          <a:p>
+            <a:r>
+              <a:rPr lang="en-US" dirty="0"/>
+              <a:t>Side-by-side: </a:t>
+            </a:r>
+            <a:r>
+              <a:rPr lang="en-US" dirty="0" err="1"/>
+              <a:t>StockApi</a:t>
+            </a:r>
+            <a:endParaRPr lang="en-US" dirty="0"/>
+          </a:p>
+        </p:txBody>
+      </p:sp>
+      <p:sp>
+        <p:nvSpPr>
+          <p:cNvPr id="3" name="Text Placeholder 2">
+            <a:extLst>
+              <a:ext uri="{FF2B5EF4-FFF2-40B4-BE49-F238E27FC236}">
+                <a16:creationId xmlns:a16="http://schemas.microsoft.com/office/drawing/2014/main" id="{FFFE4E01-A40C-451F-B06D-97B01E5447E3}"/>
+              </a:ext>
+            </a:extLst>
+          </p:cNvPr>
+          <p:cNvSpPr>
+            <a:spLocks noGrp="1"/>
+          </p:cNvSpPr>
+          <p:nvPr>
+            <p:ph type="body" idx="1"/>
+          </p:nvPr>
+        </p:nvSpPr>
+        <p:spPr>
+          <a:xfrm>
+            <a:off x="75113" y="1905000"/>
+            <a:ext cx="4396338" cy="576262"/>
+          </a:xfrm>
+        </p:spPr>
+        <p:txBody>
+          <a:bodyPr/>
+          <a:lstStyle/>
+          <a:p>
+            <a:r>
+              <a:rPr lang="en-US" dirty="0"/>
+              <a:t>C#: </a:t>
+            </a:r>
+            <a:r>
+              <a:rPr lang="en-US" dirty="0" err="1"/>
+              <a:t>StockApi.cs</a:t>
+            </a:r>
+            <a:endParaRPr lang="en-US" dirty="0"/>
+          </a:p>
+        </p:txBody>
+      </p:sp>
+      <p:sp>
+        <p:nvSpPr>
+          <p:cNvPr id="5" name="Text Placeholder 4">
+            <a:extLst>
+              <a:ext uri="{FF2B5EF4-FFF2-40B4-BE49-F238E27FC236}">
+                <a16:creationId xmlns:a16="http://schemas.microsoft.com/office/drawing/2014/main" id="{06B0338F-E234-4316-8F81-E862FA31808E}"/>
+              </a:ext>
+            </a:extLst>
+          </p:cNvPr>
+          <p:cNvSpPr>
+            <a:spLocks noGrp="1"/>
+          </p:cNvSpPr>
+          <p:nvPr>
+            <p:ph type="body" sz="quarter" idx="3"/>
+          </p:nvPr>
+        </p:nvSpPr>
+        <p:spPr>
+          <a:xfrm>
+            <a:off x="7128187" y="1905000"/>
+            <a:ext cx="4396339" cy="576262"/>
+          </a:xfrm>
+        </p:spPr>
+        <p:txBody>
+          <a:bodyPr/>
+          <a:lstStyle/>
+          <a:p>
+            <a:r>
+              <a:rPr lang="en-US" dirty="0"/>
+              <a:t>F#: </a:t>
+            </a:r>
+            <a:r>
+              <a:rPr lang="en-US" dirty="0" err="1"/>
+              <a:t>StockApi.fs</a:t>
+            </a:r>
+            <a:endParaRPr lang="en-US" dirty="0"/>
+          </a:p>
+        </p:txBody>
+      </p:sp>
+      <p:pic>
+        <p:nvPicPr>
+          <p:cNvPr id="7" name="Picture 6">
+            <a:extLst>
+              <a:ext uri="{FF2B5EF4-FFF2-40B4-BE49-F238E27FC236}">
+                <a16:creationId xmlns:a16="http://schemas.microsoft.com/office/drawing/2014/main" id="{392AEB5C-7356-4665-9492-F61A0BBB727C}"/>
+              </a:ext>
+            </a:extLst>
+          </p:cNvPr>
+          <p:cNvPicPr>
+            <a:picLocks noChangeAspect="1"/>
+          </p:cNvPicPr>
+          <p:nvPr/>
+        </p:nvPicPr>
+        <p:blipFill>
+          <a:blip r:embed="rId2"/>
+          <a:stretch>
+            <a:fillRect/>
+          </a:stretch>
+        </p:blipFill>
+        <p:spPr>
+          <a:xfrm>
+            <a:off x="75113" y="2481262"/>
+            <a:ext cx="6963747" cy="4201111"/>
+          </a:xfrm>
+          <a:prstGeom prst="rect">
+            <a:avLst/>
+          </a:prstGeom>
+        </p:spPr>
+      </p:pic>
+      <p:pic>
+        <p:nvPicPr>
+          <p:cNvPr id="10" name="Picture 9">
+            <a:extLst>
+              <a:ext uri="{FF2B5EF4-FFF2-40B4-BE49-F238E27FC236}">
+                <a16:creationId xmlns:a16="http://schemas.microsoft.com/office/drawing/2014/main" id="{C77C6D71-77C1-48EA-AEC3-8D71A5F441AB}"/>
+              </a:ext>
+            </a:extLst>
+          </p:cNvPr>
+          <p:cNvPicPr>
+            <a:picLocks noChangeAspect="1"/>
+          </p:cNvPicPr>
+          <p:nvPr/>
+        </p:nvPicPr>
+        <p:blipFill>
+          <a:blip r:embed="rId3"/>
+          <a:stretch>
+            <a:fillRect/>
+          </a:stretch>
+        </p:blipFill>
+        <p:spPr>
+          <a:xfrm>
+            <a:off x="7190333" y="2481262"/>
+            <a:ext cx="4848902" cy="2905530"/>
+          </a:xfrm>
+          <a:prstGeom prst="rect">
+            <a:avLst/>
+          </a:prstGeom>
+        </p:spPr>
+      </p:pic>
+    </p:spTree>
+    <p:extLst>
+      <p:ext uri="{BB962C8B-B14F-4D97-AF65-F5344CB8AC3E}">
+        <p14:creationId xmlns:p14="http://schemas.microsoft.com/office/powerpoint/2010/main" val="1329166653"/>
+      </p:ext>
+    </p:extLst>
+  </p:cSld>
+  <p:clrMapOvr>
+    <a:masterClrMapping/>
+  </p:clrMapOvr>
+</p:sld>
+</file>
+
+<file path=ppt/slides/slide27.xml><?xml version="1.0" encoding="utf-8"?>
+<p:sld xmlns:a="http://schemas.openxmlformats.org/drawingml/2006/main" xmlns:r="http://schemas.openxmlformats.org/officeDocument/2006/relationships" xmlns:p="http://schemas.openxmlformats.org/presentationml/2006/main">
+  <p:cSld>
+    <p:spTree>
+      <p:nvGrpSpPr>
+        <p:cNvPr id="1" name=""/>
+        <p:cNvGrpSpPr/>
+        <p:nvPr/>
+      </p:nvGrpSpPr>
+      <p:grpSpPr>
+        <a:xfrm>
+          <a:off x="0" y="0"/>
+          <a:ext cx="0" cy="0"/>
+          <a:chOff x="0" y="0"/>
+          <a:chExt cx="0" cy="0"/>
+        </a:xfrm>
+      </p:grpSpPr>
+      <p:sp>
+        <p:nvSpPr>
+          <p:cNvPr id="2" name="Title 1">
+            <a:extLst>
+              <a:ext uri="{FF2B5EF4-FFF2-40B4-BE49-F238E27FC236}">
+                <a16:creationId xmlns:a16="http://schemas.microsoft.com/office/drawing/2014/main" id="{36C21FA3-B9ED-4185-9FB9-EC4E9832AF60}"/>
+              </a:ext>
+            </a:extLst>
+          </p:cNvPr>
+          <p:cNvSpPr>
+            <a:spLocks noGrp="1"/>
+          </p:cNvSpPr>
+          <p:nvPr>
+            <p:ph type="title"/>
+          </p:nvPr>
+        </p:nvSpPr>
+        <p:spPr/>
+        <p:txBody>
+          <a:bodyPr/>
+          <a:lstStyle/>
+          <a:p>
+            <a:r>
+              <a:rPr lang="en-US" dirty="0"/>
+              <a:t>BONUS: Domain Driven Design</a:t>
+            </a:r>
+          </a:p>
+        </p:txBody>
+      </p:sp>
+      <p:sp>
+        <p:nvSpPr>
+          <p:cNvPr id="3" name="Text Placeholder 2">
+            <a:extLst>
+              <a:ext uri="{FF2B5EF4-FFF2-40B4-BE49-F238E27FC236}">
+                <a16:creationId xmlns:a16="http://schemas.microsoft.com/office/drawing/2014/main" id="{AE90A1F2-E109-4FE6-BCB8-58E1EC25A393}"/>
+              </a:ext>
+            </a:extLst>
+          </p:cNvPr>
+          <p:cNvSpPr>
+            <a:spLocks noGrp="1"/>
+          </p:cNvSpPr>
+          <p:nvPr>
+            <p:ph type="body" idx="1"/>
+          </p:nvPr>
+        </p:nvSpPr>
+        <p:spPr>
+          <a:xfrm>
+            <a:off x="646112" y="1853248"/>
+            <a:ext cx="4396338" cy="576262"/>
+          </a:xfrm>
+        </p:spPr>
+        <p:txBody>
+          <a:bodyPr/>
+          <a:lstStyle/>
+          <a:p>
+            <a:r>
+              <a:rPr lang="en-US" dirty="0"/>
+              <a:t>Skip Straight to Phase 3!</a:t>
+            </a:r>
+          </a:p>
+        </p:txBody>
+      </p:sp>
+      <p:sp>
+        <p:nvSpPr>
+          <p:cNvPr id="4" name="Content Placeholder 3">
+            <a:extLst>
+              <a:ext uri="{FF2B5EF4-FFF2-40B4-BE49-F238E27FC236}">
+                <a16:creationId xmlns:a16="http://schemas.microsoft.com/office/drawing/2014/main" id="{C682850D-0EE4-4C1A-9AA7-802CE5591ADA}"/>
+              </a:ext>
+            </a:extLst>
+          </p:cNvPr>
+          <p:cNvSpPr>
+            <a:spLocks noGrp="1"/>
+          </p:cNvSpPr>
+          <p:nvPr>
+            <p:ph sz="half" idx="2"/>
+          </p:nvPr>
+        </p:nvSpPr>
+        <p:spPr>
+          <a:xfrm>
+            <a:off x="646111" y="2462848"/>
+            <a:ext cx="4396339" cy="3741738"/>
+          </a:xfrm>
+        </p:spPr>
+        <p:txBody>
+          <a:bodyPr/>
+          <a:lstStyle/>
+          <a:p>
+            <a:r>
+              <a:rPr lang="en-US" dirty="0"/>
+              <a:t>I personally don’t always write tests.</a:t>
+            </a:r>
+          </a:p>
+          <a:p>
+            <a:r>
+              <a:rPr lang="en-US" dirty="0"/>
+              <a:t>That’s why I like to “refactor to testability” only when needed.</a:t>
+            </a:r>
+          </a:p>
+          <a:p>
+            <a:r>
+              <a:rPr lang="en-US" dirty="0"/>
+              <a:t>But, this example shows that you can jump straight to “Phase 3” to write testable domain code </a:t>
+            </a:r>
+            <a:r>
+              <a:rPr lang="en-US" i="1" dirty="0"/>
+              <a:t>before</a:t>
+            </a:r>
+            <a:r>
+              <a:rPr lang="en-US" dirty="0"/>
+              <a:t> writing any implementation!</a:t>
+            </a:r>
+          </a:p>
+        </p:txBody>
+      </p:sp>
+      <p:pic>
+        <p:nvPicPr>
+          <p:cNvPr id="7" name="Picture 6">
+            <a:extLst>
+              <a:ext uri="{FF2B5EF4-FFF2-40B4-BE49-F238E27FC236}">
+                <a16:creationId xmlns:a16="http://schemas.microsoft.com/office/drawing/2014/main" id="{6171942B-B0AC-4293-AB7C-985745F63CCD}"/>
+              </a:ext>
+            </a:extLst>
+          </p:cNvPr>
+          <p:cNvPicPr>
+            <a:picLocks noChangeAspect="1"/>
+          </p:cNvPicPr>
+          <p:nvPr/>
+        </p:nvPicPr>
+        <p:blipFill>
+          <a:blip r:embed="rId2"/>
+          <a:stretch>
+            <a:fillRect/>
+          </a:stretch>
+        </p:blipFill>
+        <p:spPr>
+          <a:xfrm>
+            <a:off x="5707391" y="1248825"/>
+            <a:ext cx="5677692" cy="5496692"/>
+          </a:xfrm>
+          <a:prstGeom prst="rect">
+            <a:avLst/>
+          </a:prstGeom>
+        </p:spPr>
+      </p:pic>
+    </p:spTree>
+    <p:extLst>
+      <p:ext uri="{BB962C8B-B14F-4D97-AF65-F5344CB8AC3E}">
+        <p14:creationId xmlns:p14="http://schemas.microsoft.com/office/powerpoint/2010/main" val="3385578703"/>
+      </p:ext>
+    </p:extLst>
+  </p:cSld>
+  <p:clrMapOvr>
+    <a:masterClrMapping/>
+  </p:clrMapOvr>
+</p:sld>
+</file>
+
+<file path=ppt/slides/slide28.xml><?xml version="1.0" encoding="utf-8"?>
+<p:sld xmlns:a="http://schemas.openxmlformats.org/drawingml/2006/main" xmlns:r="http://schemas.openxmlformats.org/officeDocument/2006/relationships" xmlns:p="http://schemas.openxmlformats.org/presentationml/2006/main">
+  <p:cSld>
+    <p:spTree>
+      <p:nvGrpSpPr>
+        <p:cNvPr id="1" name=""/>
+        <p:cNvGrpSpPr/>
+        <p:nvPr/>
+      </p:nvGrpSpPr>
+      <p:grpSpPr>
+        <a:xfrm>
+          <a:off x="0" y="0"/>
+          <a:ext cx="0" cy="0"/>
+          <a:chOff x="0" y="0"/>
+          <a:chExt cx="0" cy="0"/>
+        </a:xfrm>
+      </p:grpSpPr>
+      <p:sp>
+        <p:nvSpPr>
+          <p:cNvPr id="2" name="Title 1">
+            <a:extLst>
+              <a:ext uri="{FF2B5EF4-FFF2-40B4-BE49-F238E27FC236}">
+                <a16:creationId xmlns:a16="http://schemas.microsoft.com/office/drawing/2014/main" id="{DE0F745F-FF52-458A-AE61-2C83A6720BAA}"/>
+              </a:ext>
+            </a:extLst>
+          </p:cNvPr>
+          <p:cNvSpPr>
+            <a:spLocks noGrp="1"/>
+          </p:cNvSpPr>
+          <p:nvPr>
+            <p:ph type="title"/>
+          </p:nvPr>
+        </p:nvSpPr>
+        <p:spPr>
+          <a:xfrm>
+            <a:off x="5166803" y="2922973"/>
+            <a:ext cx="1331651" cy="736846"/>
+          </a:xfrm>
+        </p:spPr>
+        <p:txBody>
+          <a:bodyPr/>
+          <a:lstStyle/>
+          <a:p>
+            <a:r>
+              <a:rPr lang="en-US" dirty="0"/>
+              <a:t>&lt;/&gt;</a:t>
+            </a:r>
+          </a:p>
+        </p:txBody>
+      </p:sp>
+    </p:spTree>
+    <p:extLst>
+      <p:ext uri="{BB962C8B-B14F-4D97-AF65-F5344CB8AC3E}">
+        <p14:creationId xmlns:p14="http://schemas.microsoft.com/office/powerpoint/2010/main" val="3915240009"/>
       </p:ext>
     </p:extLst>
   </p:cSld>

</xml_diff>